<commit_message>
changes mostly to maps
</commit_message>
<xml_diff>
--- a/garrison_presentation.pptx
+++ b/garrison_presentation.pptx
@@ -7,7 +7,7 @@
     <p:sldMasterId id="2147483676" r:id="rId3"/>
   </p:sldMasterIdLst>
   <p:notesMasterIdLst>
-    <p:notesMasterId r:id="rId35"/>
+    <p:notesMasterId r:id="rId34"/>
   </p:notesMasterIdLst>
   <p:sldIdLst>
     <p:sldId id="256" r:id="rId4"/>
@@ -37,10 +37,9 @@
     <p:sldId id="278" r:id="rId28"/>
     <p:sldId id="279" r:id="rId29"/>
     <p:sldId id="280" r:id="rId30"/>
-    <p:sldId id="281" r:id="rId31"/>
-    <p:sldId id="288" r:id="rId32"/>
-    <p:sldId id="283" r:id="rId33"/>
-    <p:sldId id="284" r:id="rId34"/>
+    <p:sldId id="288" r:id="rId31"/>
+    <p:sldId id="283" r:id="rId32"/>
+    <p:sldId id="284" r:id="rId33"/>
   </p:sldIdLst>
   <p:sldSz cx="9144000" cy="5143500" type="screen16x9"/>
   <p:notesSz cx="6858000" cy="9144000"/>
@@ -257,7 +256,18 @@
   </p:defaultTextStyle>
   <p:extLst>
     <p:ext uri="{EFAFB233-063F-42B5-8137-9DF3F51BA10A}">
-      <p15:sldGuideLst xmlns:p15="http://schemas.microsoft.com/office/powerpoint/2012/main"/>
+      <p15:sldGuideLst xmlns:p15="http://schemas.microsoft.com/office/powerpoint/2012/main">
+        <p15:guide id="1" orient="horz" pos="1620">
+          <p15:clr>
+            <a:srgbClr val="A4A3A4"/>
+          </p15:clr>
+        </p15:guide>
+        <p15:guide id="2" pos="2880">
+          <p15:clr>
+            <a:srgbClr val="A4A3A4"/>
+          </p15:clr>
+        </p15:guide>
+      </p15:sldGuideLst>
     </p:ext>
   </p:extLst>
 </p:presentation>
@@ -2198,7 +2208,7 @@
                 </a:spcBef>
                 <a:buClrTx/>
               </a:pPr>
-              <a:t>1/15/2015</a:t>
+              <a:t>2/2/2015</a:t>
             </a:fld>
             <a:endParaRPr lang="en-US" sz="1200">
               <a:cs typeface="Arial" pitchFamily="34" charset="0"/>
@@ -3785,7 +3795,7 @@
   <p:cSld>
     <p:spTree>
       <p:nvGrpSpPr>
-        <p:cNvPr id="1" name="Shape 199"/>
+        <p:cNvPr id="1" name="Shape 211"/>
         <p:cNvGrpSpPr/>
         <p:nvPr/>
       </p:nvGrpSpPr>
@@ -3799,7 +3809,7 @@
       </p:grpSpPr>
       <p:sp>
         <p:nvSpPr>
-          <p:cNvPr id="200" name="Shape 200"/>
+          <p:cNvPr id="212" name="Shape 212"/>
           <p:cNvSpPr>
             <a:spLocks noGrp="1" noRot="1" noChangeAspect="1"/>
           </p:cNvSpPr>
@@ -3850,122 +3860,6 @@
       </p:sp>
       <p:sp>
         <p:nvSpPr>
-          <p:cNvPr id="201" name="Shape 201"/>
-          <p:cNvSpPr txBox="1">
-            <a:spLocks noGrp="1"/>
-          </p:cNvSpPr>
-          <p:nvPr>
-            <p:ph type="body" idx="1"/>
-          </p:nvPr>
-        </p:nvSpPr>
-        <p:spPr>
-          <a:xfrm>
-            <a:off x="685800" y="4343400"/>
-            <a:ext cx="5486399" cy="4114800"/>
-          </a:xfrm>
-          <a:prstGeom prst="rect">
-            <a:avLst/>
-          </a:prstGeom>
-        </p:spPr>
-        <p:txBody>
-          <a:bodyPr lIns="91425" tIns="91425" rIns="91425" bIns="91425" anchor="t" anchorCtr="0">
-            <a:noAutofit/>
-          </a:bodyPr>
-          <a:lstStyle/>
-          <a:p>
-            <a:pPr>
-              <a:spcBef>
-                <a:spcPts val="0"/>
-              </a:spcBef>
-              <a:buNone/>
-            </a:pPr>
-            <a:endParaRPr/>
-          </a:p>
-        </p:txBody>
-      </p:sp>
-    </p:spTree>
-    <p:extLst>
-      <p:ext uri="{BB962C8B-B14F-4D97-AF65-F5344CB8AC3E}">
-        <p14:creationId xmlns:p14="http://schemas.microsoft.com/office/powerpoint/2010/main" val="169483712"/>
-      </p:ext>
-    </p:extLst>
-  </p:cSld>
-  <p:clrMapOvr>
-    <a:masterClrMapping/>
-  </p:clrMapOvr>
-</p:notes>
-</file>
-
-<file path=ppt/notesSlides/notesSlide28.xml><?xml version="1.0" encoding="utf-8"?>
-<p:notes xmlns:a="http://schemas.openxmlformats.org/drawingml/2006/main" xmlns:r="http://schemas.openxmlformats.org/officeDocument/2006/relationships" xmlns:p="http://schemas.openxmlformats.org/presentationml/2006/main" showMasterSp="0" showMasterPhAnim="0">
-  <p:cSld>
-    <p:spTree>
-      <p:nvGrpSpPr>
-        <p:cNvPr id="1" name="Shape 211"/>
-        <p:cNvGrpSpPr/>
-        <p:nvPr/>
-      </p:nvGrpSpPr>
-      <p:grpSpPr>
-        <a:xfrm>
-          <a:off x="0" y="0"/>
-          <a:ext cx="0" cy="0"/>
-          <a:chOff x="0" y="0"/>
-          <a:chExt cx="0" cy="0"/>
-        </a:xfrm>
-      </p:grpSpPr>
-      <p:sp>
-        <p:nvSpPr>
-          <p:cNvPr id="212" name="Shape 212"/>
-          <p:cNvSpPr>
-            <a:spLocks noGrp="1" noRot="1" noChangeAspect="1"/>
-          </p:cNvSpPr>
-          <p:nvPr>
-            <p:ph type="sldImg" idx="2"/>
-          </p:nvPr>
-        </p:nvSpPr>
-        <p:spPr>
-          <a:xfrm>
-            <a:off x="381000" y="685800"/>
-            <a:ext cx="6096000" cy="3429000"/>
-          </a:xfrm>
-          <a:custGeom>
-            <a:avLst/>
-            <a:gdLst/>
-            <a:ahLst/>
-            <a:cxnLst/>
-            <a:rect l="0" t="0" r="0" b="0"/>
-            <a:pathLst>
-              <a:path w="120000" h="120000" extrusionOk="0">
-                <a:moveTo>
-                  <a:pt x="0" y="0"/>
-                </a:moveTo>
-                <a:lnTo>
-                  <a:pt x="120000" y="0"/>
-                </a:lnTo>
-                <a:lnTo>
-                  <a:pt x="120000" y="120000"/>
-                </a:lnTo>
-                <a:lnTo>
-                  <a:pt x="0" y="120000"/>
-                </a:lnTo>
-                <a:close/>
-              </a:path>
-            </a:pathLst>
-          </a:custGeom>
-          <a:noFill/>
-          <a:ln w="9525" cap="flat">
-            <a:solidFill>
-              <a:srgbClr val="000000"/>
-            </a:solidFill>
-            <a:prstDash val="solid"/>
-            <a:round/>
-            <a:headEnd type="none" w="med" len="med"/>
-            <a:tailEnd type="none" w="med" len="med"/>
-          </a:ln>
-        </p:spPr>
-      </p:sp>
-      <p:sp>
-        <p:nvSpPr>
           <p:cNvPr id="213" name="Shape 213"/>
           <p:cNvSpPr txBox="1">
             <a:spLocks noGrp="1"/>
@@ -4012,7 +3906,7 @@
 </p:notes>
 </file>
 
-<file path=ppt/notesSlides/notesSlide29.xml><?xml version="1.0" encoding="utf-8"?>
+<file path=ppt/notesSlides/notesSlide28.xml><?xml version="1.0" encoding="utf-8"?>
 <p:notes xmlns:a="http://schemas.openxmlformats.org/drawingml/2006/main" xmlns:r="http://schemas.openxmlformats.org/officeDocument/2006/relationships" xmlns:p="http://schemas.openxmlformats.org/presentationml/2006/main" showMasterSp="0" showMasterPhAnim="0">
   <p:cSld>
     <p:spTree>
@@ -5158,7 +5052,7 @@
           <a:p>
             <a:fld id="{2B620634-F1E7-4F42-B7F2-04F33F3FC495}" type="datetimeFigureOut">
               <a:rPr lang="en-US" smtClean="0"/>
-              <a:t>1/15/2015</a:t>
+              <a:t>2/2/2015</a:t>
             </a:fld>
             <a:endParaRPr lang="en-US"/>
           </a:p>
@@ -11705,7 +11599,7 @@
             </a:pPr>
             <a:r>
               <a:rPr lang="en-US" dirty="0" smtClean="0"/>
-              <a:t>Better than base R for creating plotting</a:t>
+              <a:t>Better than base R for creating plots</a:t>
             </a:r>
             <a:endParaRPr lang="en-US" dirty="0"/>
           </a:p>
@@ -11777,9 +11671,18 @@
   <p:clrMapOvr>
     <a:masterClrMapping/>
   </p:clrMapOvr>
-  <p:transition spd="slow">
-    <p:cut/>
-  </p:transition>
+  <mc:AlternateContent xmlns:mc="http://schemas.openxmlformats.org/markup-compatibility/2006">
+    <mc:Choice xmlns:p14="http://schemas.microsoft.com/office/powerpoint/2010/main" Requires="p14">
+      <p:transition spd="slow" p14:dur="3400">
+        <p14:reveal/>
+      </p:transition>
+    </mc:Choice>
+    <mc:Fallback>
+      <p:transition spd="slow">
+        <p:fade/>
+      </p:transition>
+    </mc:Fallback>
+  </mc:AlternateContent>
   <p:timing>
     <p:tnLst>
       <p:par>
@@ -13108,19 +13011,8 @@
                 <a:ea typeface="ＭＳ Ｐゴシック" pitchFamily="34" charset="-128"/>
                 <a:cs typeface="Arial" pitchFamily="34" charset="0"/>
               </a:rPr>
-              <a:t>Source: </a:t>
-            </a:r>
-            <a:r>
-              <a:rPr lang="en-US" sz="750" b="1" dirty="0">
-                <a:ea typeface="ＭＳ Ｐゴシック" pitchFamily="34" charset="-128"/>
-                <a:cs typeface="Arial" pitchFamily="34" charset="0"/>
-              </a:rPr>
-              <a:t>CSC</a:t>
-            </a:r>
-            <a:endParaRPr lang="en-US" sz="750" b="1" dirty="0">
-              <a:ea typeface="ＭＳ Ｐゴシック" pitchFamily="34" charset="-128"/>
-              <a:cs typeface="Arial" pitchFamily="34" charset="0"/>
-            </a:endParaRPr>
+              <a:t>Source: CSC</a:t>
+            </a:r>
           </a:p>
         </p:txBody>
       </p:sp>
@@ -13183,13 +13075,6 @@
               </a:rPr>
               <a:t>35 ZB</a:t>
             </a:r>
-            <a:endParaRPr lang="en-US" sz="1200" b="1" dirty="0">
-              <a:solidFill>
-                <a:schemeClr val="hlink"/>
-              </a:solidFill>
-              <a:latin typeface="Arial" charset="0"/>
-              <a:cs typeface="Arial" charset="0"/>
-            </a:endParaRPr>
           </a:p>
         </p:txBody>
       </p:sp>
@@ -13788,10 +13673,6 @@
               </a:rPr>
               <a:t>2020</a:t>
             </a:r>
-            <a:endParaRPr lang="en-US" sz="1050" dirty="0">
-              <a:latin typeface="Arial" charset="0"/>
-              <a:cs typeface="Arial" charset="0"/>
-            </a:endParaRPr>
           </a:p>
         </p:txBody>
       </p:sp>
@@ -15803,7 +15684,7 @@
   <p:cSld>
     <p:spTree>
       <p:nvGrpSpPr>
-        <p:cNvPr id="1" name="Shape 196"/>
+        <p:cNvPr id="1" name=""/>
         <p:cNvGrpSpPr/>
         <p:nvPr/>
       </p:nvGrpSpPr>
@@ -15817,111 +15698,58 @@
       </p:grpSpPr>
       <p:sp>
         <p:nvSpPr>
-          <p:cNvPr id="197" name="Shape 197"/>
-          <p:cNvSpPr txBox="1">
+          <p:cNvPr id="2" name="Slide Number Placeholder 1"/>
+          <p:cNvSpPr>
             <a:spLocks noGrp="1"/>
           </p:cNvSpPr>
           <p:nvPr>
-            <p:ph type="body" idx="1"/>
-          </p:nvPr>
-        </p:nvSpPr>
+            <p:ph type="sldNum" sz="quarter" idx="12"/>
+          </p:nvPr>
+        </p:nvSpPr>
+        <p:spPr/>
+        <p:txBody>
+          <a:bodyPr/>
+          <a:lstStyle/>
+          <a:p>
+            <a:fld id="{90C7FAB7-A015-1C4E-BC6D-609B5E539335}" type="slidenum">
+              <a:rPr lang="en-US" smtClean="0"/>
+              <a:pPr/>
+              <a:t>28</a:t>
+            </a:fld>
+            <a:endParaRPr lang="en-US" dirty="0"/>
+          </a:p>
+        </p:txBody>
+      </p:sp>
+      <p:pic>
+        <p:nvPicPr>
+          <p:cNvPr id="3" name="Picture 2"/>
+          <p:cNvPicPr>
+            <a:picLocks noChangeAspect="1"/>
+          </p:cNvPicPr>
+          <p:nvPr/>
+        </p:nvPicPr>
+        <p:blipFill>
+          <a:blip r:embed="rId2"/>
+          <a:stretch>
+            <a:fillRect/>
+          </a:stretch>
+        </p:blipFill>
         <p:spPr>
+          <a:xfrm>
+            <a:off x="1991224" y="0"/>
+            <a:ext cx="5625060" cy="6036399"/>
+          </a:xfrm>
           <a:prstGeom prst="rect">
             <a:avLst/>
           </a:prstGeom>
         </p:spPr>
-        <p:txBody>
-          <a:bodyPr lIns="91425" tIns="91425" rIns="91425" bIns="91425" anchor="t" anchorCtr="0">
-            <a:noAutofit/>
-          </a:bodyPr>
-          <a:lstStyle/>
-          <a:p>
-            <a:pPr marL="457200" lvl="0" indent="-431800" rtl="0">
-              <a:lnSpc>
-                <a:spcPct val="150000"/>
-              </a:lnSpc>
-              <a:spcBef>
-                <a:spcPts val="0"/>
-              </a:spcBef>
-              <a:buClr>
-                <a:schemeClr val="dk2"/>
-              </a:buClr>
-              <a:buSzPct val="100000"/>
-              <a:buFont typeface="Arial"/>
-              <a:buChar char="●"/>
-            </a:pPr>
-            <a:r>
-              <a:rPr lang="en" dirty="0" smtClean="0"/>
-              <a:t>ggvis</a:t>
-            </a:r>
-            <a:endParaRPr lang="en" dirty="0"/>
-          </a:p>
-          <a:p>
-            <a:pPr marL="457200" lvl="0" indent="-431800" rtl="0">
-              <a:lnSpc>
-                <a:spcPct val="150000"/>
-              </a:lnSpc>
-              <a:spcBef>
-                <a:spcPts val="0"/>
-              </a:spcBef>
-              <a:buClr>
-                <a:schemeClr val="dk2"/>
-              </a:buClr>
-              <a:buSzPct val="100000"/>
-              <a:buFont typeface="Arial"/>
-              <a:buChar char="●"/>
-            </a:pPr>
-            <a:r>
-              <a:rPr lang="en" dirty="0"/>
-              <a:t>Demo (if we have time)</a:t>
-            </a:r>
-          </a:p>
-          <a:p>
-            <a:pPr lvl="0">
-              <a:spcBef>
-                <a:spcPts val="0"/>
-              </a:spcBef>
-              <a:buNone/>
-            </a:pPr>
-            <a:endParaRPr dirty="0"/>
-          </a:p>
-        </p:txBody>
-      </p:sp>
-      <p:sp>
-        <p:nvSpPr>
-          <p:cNvPr id="198" name="Shape 198"/>
-          <p:cNvSpPr txBox="1">
-            <a:spLocks noGrp="1"/>
-          </p:cNvSpPr>
-          <p:nvPr>
-            <p:ph type="title"/>
-          </p:nvPr>
-        </p:nvSpPr>
-        <p:spPr>
-          <a:prstGeom prst="rect">
-            <a:avLst/>
-          </a:prstGeom>
-        </p:spPr>
-        <p:txBody>
-          <a:bodyPr lIns="91425" tIns="91425" rIns="91425" bIns="91425" anchor="b" anchorCtr="0">
-            <a:noAutofit/>
-          </a:bodyPr>
-          <a:lstStyle/>
-          <a:p>
-            <a:pPr>
-              <a:spcBef>
-                <a:spcPts val="0"/>
-              </a:spcBef>
-              <a:buNone/>
-            </a:pPr>
-            <a:r>
-              <a:rPr lang="en"/>
-              <a:t>Demo R Interactive Plots</a:t>
-            </a:r>
-          </a:p>
-        </p:txBody>
-      </p:sp>
+      </p:pic>
     </p:spTree>
+    <p:extLst>
+      <p:ext uri="{BB962C8B-B14F-4D97-AF65-F5344CB8AC3E}">
+        <p14:creationId xmlns:p14="http://schemas.microsoft.com/office/powerpoint/2010/main" val="3529625423"/>
+      </p:ext>
+    </p:extLst>
   </p:cSld>
   <p:clrMapOvr>
     <a:masterClrMapping/>
@@ -15944,7 +15772,7 @@
   <p:cSld>
     <p:spTree>
       <p:nvGrpSpPr>
-        <p:cNvPr id="1" name=""/>
+        <p:cNvPr id="1" name="Shape 208"/>
         <p:cNvGrpSpPr/>
         <p:nvPr/>
       </p:nvGrpSpPr>
@@ -15958,58 +15786,112 @@
       </p:grpSpPr>
       <p:sp>
         <p:nvSpPr>
-          <p:cNvPr id="2" name="Slide Number Placeholder 1"/>
-          <p:cNvSpPr>
+          <p:cNvPr id="209" name="Shape 209"/>
+          <p:cNvSpPr txBox="1">
             <a:spLocks noGrp="1"/>
           </p:cNvSpPr>
           <p:nvPr>
-            <p:ph type="sldNum" sz="quarter" idx="12"/>
-          </p:nvPr>
-        </p:nvSpPr>
-        <p:spPr/>
-        <p:txBody>
-          <a:bodyPr/>
-          <a:lstStyle/>
-          <a:p>
-            <a:fld id="{90C7FAB7-A015-1C4E-BC6D-609B5E539335}" type="slidenum">
-              <a:rPr lang="en-US" smtClean="0"/>
-              <a:pPr/>
-              <a:t>29</a:t>
-            </a:fld>
-            <a:endParaRPr lang="en-US" dirty="0"/>
-          </a:p>
-        </p:txBody>
-      </p:sp>
-      <p:pic>
-        <p:nvPicPr>
-          <p:cNvPr id="3" name="Picture 2"/>
-          <p:cNvPicPr>
-            <a:picLocks noChangeAspect="1"/>
-          </p:cNvPicPr>
-          <p:nvPr/>
-        </p:nvPicPr>
-        <p:blipFill>
-          <a:blip r:embed="rId2"/>
-          <a:stretch>
-            <a:fillRect/>
-          </a:stretch>
-        </p:blipFill>
+            <p:ph type="body" idx="1"/>
+          </p:nvPr>
+        </p:nvSpPr>
         <p:spPr>
-          <a:xfrm>
-            <a:off x="1991224" y="0"/>
-            <a:ext cx="5625060" cy="6036399"/>
-          </a:xfrm>
           <a:prstGeom prst="rect">
             <a:avLst/>
           </a:prstGeom>
         </p:spPr>
-      </p:pic>
+        <p:txBody>
+          <a:bodyPr lIns="91425" tIns="91425" rIns="91425" bIns="91425" anchor="t" anchorCtr="0">
+            <a:noAutofit/>
+          </a:bodyPr>
+          <a:lstStyle/>
+          <a:p>
+            <a:pPr marL="457200" lvl="0" indent="-381000" rtl="0">
+              <a:spcBef>
+                <a:spcPts val="0"/>
+              </a:spcBef>
+              <a:buClr>
+                <a:schemeClr val="dk2"/>
+              </a:buClr>
+              <a:buSzPct val="100000"/>
+              <a:buFont typeface="Trebuchet MS"/>
+              <a:buAutoNum type="arabicPeriod"/>
+            </a:pPr>
+            <a:r>
+              <a:rPr lang="en" sz="2400" dirty="0"/>
+              <a:t>Chang, Winston. R Graphics Cookbook, 2013.</a:t>
+            </a:r>
+          </a:p>
+          <a:p>
+            <a:pPr marL="457200" lvl="0" indent="-381000" rtl="0">
+              <a:spcBef>
+                <a:spcPts val="0"/>
+              </a:spcBef>
+              <a:buClr>
+                <a:schemeClr val="dk2"/>
+              </a:buClr>
+              <a:buSzPct val="100000"/>
+              <a:buFont typeface="Trebuchet MS"/>
+              <a:buAutoNum type="arabicPeriod"/>
+            </a:pPr>
+            <a:r>
+              <a:rPr lang="en" sz="2400" dirty="0"/>
+              <a:t>Rittman, Mark. Using Oracle R Enterprise to Analyze Large In-Database Datasets, 2014. URL http://www.rittmanmead.com/2014/03/using-oracle-r-enterprise-to-analyze-large-in-database-datasets/. </a:t>
+            </a:r>
+          </a:p>
+          <a:p>
+            <a:pPr marL="457200" lvl="0" indent="-381000">
+              <a:spcBef>
+                <a:spcPts val="0"/>
+              </a:spcBef>
+              <a:buClr>
+                <a:schemeClr val="dk2"/>
+              </a:buClr>
+              <a:buSzPct val="100000"/>
+              <a:buFont typeface="Trebuchet MS"/>
+              <a:buAutoNum type="arabicPeriod"/>
+            </a:pPr>
+            <a:r>
+              <a:rPr lang="en" sz="2400" dirty="0"/>
+              <a:t>Wickham, Hadley. ggplot2: Elegant Graphics for Data Analysis (Use R!), 2009.</a:t>
+            </a:r>
+          </a:p>
+        </p:txBody>
+      </p:sp>
+      <p:sp>
+        <p:nvSpPr>
+          <p:cNvPr id="210" name="Shape 210"/>
+          <p:cNvSpPr txBox="1">
+            <a:spLocks noGrp="1"/>
+          </p:cNvSpPr>
+          <p:nvPr>
+            <p:ph type="title"/>
+          </p:nvPr>
+        </p:nvSpPr>
+        <p:spPr>
+          <a:prstGeom prst="rect">
+            <a:avLst/>
+          </a:prstGeom>
+        </p:spPr>
+        <p:txBody>
+          <a:bodyPr lIns="91425" tIns="91425" rIns="91425" bIns="91425" anchor="b" anchorCtr="0">
+            <a:noAutofit/>
+          </a:bodyPr>
+          <a:lstStyle/>
+          <a:p>
+            <a:pPr>
+              <a:spcBef>
+                <a:spcPts val="0"/>
+              </a:spcBef>
+              <a:buNone/>
+            </a:pPr>
+            <a:r>
+              <a:rPr lang="en"/>
+              <a:t>References</a:t>
+            </a:r>
+          </a:p>
+        </p:txBody>
+      </p:sp>
     </p:spTree>
-    <p:extLst>
-      <p:ext uri="{BB962C8B-B14F-4D97-AF65-F5344CB8AC3E}">
-        <p14:creationId xmlns:p14="http://schemas.microsoft.com/office/powerpoint/2010/main" val="3529625423"/>
-      </p:ext>
-    </p:extLst>
   </p:cSld>
   <p:clrMapOvr>
     <a:masterClrMapping/>
@@ -16017,6 +15899,13 @@
   <p:transition spd="slow">
     <p:cut/>
   </p:transition>
+  <p:timing>
+    <p:tnLst>
+      <p:par>
+        <p:cTn id="1" dur="indefinite" restart="never" nodeType="tmRoot"/>
+      </p:par>
+    </p:tnLst>
+  </p:timing>
 </p:sld>
 </file>
 
@@ -16154,8 +16043,28 @@
             </a:pPr>
             <a:r>
               <a:rPr lang="en" dirty="0"/>
-              <a:t>Finish in time for lunch</a:t>
-            </a:r>
+              <a:t>Finish </a:t>
+            </a:r>
+            <a:r>
+              <a:rPr lang="en" dirty="0" smtClean="0"/>
+              <a:t>on time</a:t>
+            </a:r>
+          </a:p>
+          <a:p>
+            <a:pPr marL="25400" lvl="0" indent="0" rtl="0">
+              <a:lnSpc>
+                <a:spcPct val="150000"/>
+              </a:lnSpc>
+              <a:spcBef>
+                <a:spcPts val="0"/>
+              </a:spcBef>
+              <a:buClr>
+                <a:schemeClr val="dk2"/>
+              </a:buClr>
+              <a:buSzPct val="100000"/>
+              <a:buNone/>
+            </a:pPr>
+            <a:endParaRPr lang="en" dirty="0"/>
           </a:p>
           <a:p>
             <a:pPr marL="457200" lvl="0" indent="0">
@@ -16234,148 +16143,6 @@
   <p:cSld>
     <p:spTree>
       <p:nvGrpSpPr>
-        <p:cNvPr id="1" name="Shape 208"/>
-        <p:cNvGrpSpPr/>
-        <p:nvPr/>
-      </p:nvGrpSpPr>
-      <p:grpSpPr>
-        <a:xfrm>
-          <a:off x="0" y="0"/>
-          <a:ext cx="0" cy="0"/>
-          <a:chOff x="0" y="0"/>
-          <a:chExt cx="0" cy="0"/>
-        </a:xfrm>
-      </p:grpSpPr>
-      <p:sp>
-        <p:nvSpPr>
-          <p:cNvPr id="209" name="Shape 209"/>
-          <p:cNvSpPr txBox="1">
-            <a:spLocks noGrp="1"/>
-          </p:cNvSpPr>
-          <p:nvPr>
-            <p:ph type="body" idx="1"/>
-          </p:nvPr>
-        </p:nvSpPr>
-        <p:spPr>
-          <a:prstGeom prst="rect">
-            <a:avLst/>
-          </a:prstGeom>
-        </p:spPr>
-        <p:txBody>
-          <a:bodyPr lIns="91425" tIns="91425" rIns="91425" bIns="91425" anchor="t" anchorCtr="0">
-            <a:noAutofit/>
-          </a:bodyPr>
-          <a:lstStyle/>
-          <a:p>
-            <a:pPr marL="457200" lvl="0" indent="-381000" rtl="0">
-              <a:spcBef>
-                <a:spcPts val="0"/>
-              </a:spcBef>
-              <a:buClr>
-                <a:schemeClr val="dk2"/>
-              </a:buClr>
-              <a:buSzPct val="100000"/>
-              <a:buFont typeface="Trebuchet MS"/>
-              <a:buAutoNum type="arabicPeriod"/>
-            </a:pPr>
-            <a:r>
-              <a:rPr lang="en" sz="2400" dirty="0"/>
-              <a:t>Chang, Winston. R Graphics Cookbook, 2013.</a:t>
-            </a:r>
-          </a:p>
-          <a:p>
-            <a:pPr marL="457200" lvl="0" indent="-381000" rtl="0">
-              <a:spcBef>
-                <a:spcPts val="0"/>
-              </a:spcBef>
-              <a:buClr>
-                <a:schemeClr val="dk2"/>
-              </a:buClr>
-              <a:buSzPct val="100000"/>
-              <a:buFont typeface="Trebuchet MS"/>
-              <a:buAutoNum type="arabicPeriod"/>
-            </a:pPr>
-            <a:r>
-              <a:rPr lang="en" sz="2400" dirty="0"/>
-              <a:t>Rittman, Mark. Using Oracle R Enterprise to Analyze Large In-Database Datasets, 2014. URL http://www.rittmanmead.com/2014/03/using-oracle-r-enterprise-to-analyze-large-in-database-datasets/. </a:t>
-            </a:r>
-          </a:p>
-          <a:p>
-            <a:pPr marL="457200" lvl="0" indent="-381000">
-              <a:spcBef>
-                <a:spcPts val="0"/>
-              </a:spcBef>
-              <a:buClr>
-                <a:schemeClr val="dk2"/>
-              </a:buClr>
-              <a:buSzPct val="100000"/>
-              <a:buFont typeface="Trebuchet MS"/>
-              <a:buAutoNum type="arabicPeriod"/>
-            </a:pPr>
-            <a:r>
-              <a:rPr lang="en" sz="2400" dirty="0"/>
-              <a:t>Wickham, Hadley. ggplot2: Elegant Graphics for Data Analysis (Use R!), 2009.</a:t>
-            </a:r>
-          </a:p>
-        </p:txBody>
-      </p:sp>
-      <p:sp>
-        <p:nvSpPr>
-          <p:cNvPr id="210" name="Shape 210"/>
-          <p:cNvSpPr txBox="1">
-            <a:spLocks noGrp="1"/>
-          </p:cNvSpPr>
-          <p:nvPr>
-            <p:ph type="title"/>
-          </p:nvPr>
-        </p:nvSpPr>
-        <p:spPr>
-          <a:prstGeom prst="rect">
-            <a:avLst/>
-          </a:prstGeom>
-        </p:spPr>
-        <p:txBody>
-          <a:bodyPr lIns="91425" tIns="91425" rIns="91425" bIns="91425" anchor="b" anchorCtr="0">
-            <a:noAutofit/>
-          </a:bodyPr>
-          <a:lstStyle/>
-          <a:p>
-            <a:pPr>
-              <a:spcBef>
-                <a:spcPts val="0"/>
-              </a:spcBef>
-              <a:buNone/>
-            </a:pPr>
-            <a:r>
-              <a:rPr lang="en"/>
-              <a:t>References</a:t>
-            </a:r>
-          </a:p>
-        </p:txBody>
-      </p:sp>
-    </p:spTree>
-  </p:cSld>
-  <p:clrMapOvr>
-    <a:masterClrMapping/>
-  </p:clrMapOvr>
-  <p:transition spd="slow">
-    <p:cut/>
-  </p:transition>
-  <p:timing>
-    <p:tnLst>
-      <p:par>
-        <p:cTn id="1" dur="indefinite" restart="never" nodeType="tmRoot"/>
-      </p:par>
-    </p:tnLst>
-  </p:timing>
-</p:sld>
-</file>
-
-<file path=ppt/slides/slide31.xml><?xml version="1.0" encoding="utf-8"?>
-<p:sld xmlns:a="http://schemas.openxmlformats.org/drawingml/2006/main" xmlns:r="http://schemas.openxmlformats.org/officeDocument/2006/relationships" xmlns:p="http://schemas.openxmlformats.org/presentationml/2006/main">
-  <p:cSld>
-    <p:spTree>
-      <p:nvGrpSpPr>
         <p:cNvPr id="1" name="Shape 214"/>
         <p:cNvGrpSpPr/>
         <p:nvPr/>
@@ -16416,9 +16183,10 @@
               <a:buNone/>
             </a:pPr>
             <a:r>
-              <a:rPr lang="en" sz="3000"/>
+              <a:rPr lang="en" sz="3000" dirty="0"/>
               <a:t>Contact: </a:t>
             </a:r>
+            <a:endParaRPr lang="en" sz="3000" dirty="0" smtClean="0"/>
           </a:p>
           <a:p>
             <a:pPr rtl="0">
@@ -16428,27 +16196,36 @@
               <a:buNone/>
             </a:pPr>
             <a:r>
-              <a:rPr lang="en" sz="3000" u="sng">
-                <a:solidFill>
-                  <a:schemeClr val="hlink"/>
-                </a:solidFill>
-                <a:hlinkClick r:id="rId3"/>
+              <a:rPr lang="en-US" sz="3000" dirty="0" err="1" smtClean="0">
+                <a:hlinkClick r:id="rId3" action="ppaction://hlinkfile"/>
               </a:rPr>
-              <a:t>gary.garrison@arisant.com</a:t>
-            </a:r>
-            <a:r>
-              <a:rPr lang="en" sz="3000"/>
-              <a:t> or </a:t>
-            </a:r>
-            <a:r>
-              <a:rPr lang="en" sz="3000" u="sng">
+              <a:t>arisant</a:t>
+            </a:r>
+            <a:r>
+              <a:rPr lang="en" sz="3000" dirty="0" smtClean="0">
+                <a:hlinkClick r:id="rId3" action="ppaction://hlinkfile"/>
+              </a:rPr>
+              <a:t>.com</a:t>
+            </a:r>
+            <a:endParaRPr lang="en" sz="3000" dirty="0"/>
+          </a:p>
+          <a:p>
+            <a:pPr rtl="0">
+              <a:spcBef>
+                <a:spcPts val="0"/>
+              </a:spcBef>
+              <a:buNone/>
+            </a:pPr>
+            <a:r>
+              <a:rPr lang="en" sz="3000" u="sng" dirty="0" smtClean="0">
                 <a:solidFill>
                   <a:schemeClr val="hlink"/>
                 </a:solidFill>
                 <a:hlinkClick r:id="rId4"/>
               </a:rPr>
-              <a:t>garrisongw@gmail.com</a:t>
-            </a:r>
+              <a:t>gary.garrison@arisant.com</a:t>
+            </a:r>
+            <a:endParaRPr lang="en-US" dirty="0" smtClean="0"/>
           </a:p>
           <a:p>
             <a:pPr rtl="0">
@@ -16457,7 +16234,7 @@
               </a:spcBef>
               <a:buNone/>
             </a:pPr>
-            <a:endParaRPr/>
+            <a:endParaRPr dirty="0"/>
           </a:p>
           <a:p>
             <a:pPr rtl="0">
@@ -16467,7 +16244,7 @@
               <a:buNone/>
             </a:pPr>
             <a:r>
-              <a:rPr lang="en" sz="3000"/>
+              <a:rPr lang="en" sz="3000" dirty="0"/>
               <a:t>Github Repository:</a:t>
             </a:r>
           </a:p>
@@ -16479,9 +16256,45 @@
               <a:buNone/>
             </a:pPr>
             <a:r>
-              <a:rPr lang="en" sz="3000"/>
-              <a:t>https://github.com/gwgarrison/rmoug_2015</a:t>
-            </a:r>
+              <a:rPr lang="en" sz="3000" dirty="0">
+                <a:hlinkClick r:id="rId5"/>
+              </a:rPr>
+              <a:t>https://</a:t>
+            </a:r>
+            <a:r>
+              <a:rPr lang="en" sz="3000" dirty="0" smtClean="0">
+                <a:hlinkClick r:id="rId5"/>
+              </a:rPr>
+              <a:t>github.com/gwgarrison/rmoug_2015</a:t>
+            </a:r>
+            <a:endParaRPr lang="en" sz="3000" dirty="0" smtClean="0"/>
+          </a:p>
+          <a:p>
+            <a:pPr>
+              <a:spcBef>
+                <a:spcPts val="0"/>
+              </a:spcBef>
+              <a:buNone/>
+            </a:pPr>
+            <a:endParaRPr lang="en" sz="3000" dirty="0" smtClean="0"/>
+          </a:p>
+          <a:p>
+            <a:pPr>
+              <a:spcBef>
+                <a:spcPts val="0"/>
+              </a:spcBef>
+              <a:buNone/>
+            </a:pPr>
+            <a:endParaRPr lang="en" sz="3000" dirty="0"/>
+          </a:p>
+          <a:p>
+            <a:pPr>
+              <a:spcBef>
+                <a:spcPts val="0"/>
+              </a:spcBef>
+              <a:buNone/>
+            </a:pPr>
+            <a:endParaRPr lang="en" sz="3000" dirty="0"/>
           </a:p>
         </p:txBody>
       </p:sp>
@@ -16631,31 +16444,11 @@
             </a:pPr>
             <a:r>
               <a:rPr lang="en" dirty="0"/>
-              <a:t>Map based plots with R</a:t>
-            </a:r>
-          </a:p>
-          <a:p>
-            <a:pPr marL="457200" lvl="0" indent="-431800">
-              <a:lnSpc>
-                <a:spcPct val="150000"/>
-              </a:lnSpc>
-              <a:spcBef>
-                <a:spcPts val="0"/>
-              </a:spcBef>
-              <a:buClr>
-                <a:schemeClr val="dk2"/>
-              </a:buClr>
-              <a:buSzPct val="100000"/>
-              <a:buFont typeface="Arial"/>
-              <a:buChar char="●"/>
-            </a:pPr>
-            <a:r>
-              <a:rPr lang="en" dirty="0"/>
-              <a:t>Interactive pots with </a:t>
+              <a:t>Map based plots with </a:t>
             </a:r>
             <a:r>
               <a:rPr lang="en" dirty="0" smtClean="0"/>
-              <a:t>R (if we have time)</a:t>
+              <a:t>R</a:t>
             </a:r>
             <a:endParaRPr lang="en" dirty="0"/>
           </a:p>
@@ -17312,9 +17105,10 @@
               <a:buChar char="●"/>
             </a:pPr>
             <a:r>
-              <a:rPr lang="en" dirty="0"/>
-              <a:t>Popular</a:t>
-            </a:r>
+              <a:rPr lang="en" dirty="0" smtClean="0"/>
+              <a:t>Popular </a:t>
+            </a:r>
+            <a:endParaRPr lang="en" dirty="0"/>
           </a:p>
           <a:p>
             <a:pPr marL="457200" lvl="0" indent="0" rtl="0">

</xml_diff>

<commit_message>
change 2/15, added some references and rearranged some files
</commit_message>
<xml_diff>
--- a/garrison_presentation.pptx
+++ b/garrison_presentation.pptx
@@ -634,7 +634,7 @@
               </a:spcBef>
               <a:buNone/>
             </a:pPr>
-            <a:endParaRPr/>
+            <a:endParaRPr dirty="0"/>
           </a:p>
         </p:txBody>
       </p:sp>
@@ -878,7 +878,7 @@
               </a:spcBef>
               <a:buNone/>
             </a:pPr>
-            <a:endParaRPr/>
+            <a:endParaRPr dirty="0"/>
           </a:p>
         </p:txBody>
       </p:sp>
@@ -994,7 +994,7 @@
               </a:spcBef>
               <a:buNone/>
             </a:pPr>
-            <a:endParaRPr/>
+            <a:endParaRPr dirty="0"/>
           </a:p>
         </p:txBody>
       </p:sp>
@@ -1110,7 +1110,7 @@
               </a:spcBef>
               <a:buNone/>
             </a:pPr>
-            <a:endParaRPr/>
+            <a:endParaRPr dirty="0"/>
           </a:p>
         </p:txBody>
       </p:sp>
@@ -1345,7 +1345,7 @@
               </a:spcBef>
               <a:buNone/>
             </a:pPr>
-            <a:endParaRPr/>
+            <a:endParaRPr dirty="0"/>
           </a:p>
         </p:txBody>
       </p:sp>
@@ -1461,7 +1461,7 @@
               </a:spcBef>
               <a:buNone/>
             </a:pPr>
-            <a:endParaRPr/>
+            <a:endParaRPr dirty="0"/>
           </a:p>
         </p:txBody>
       </p:sp>
@@ -1577,7 +1577,7 @@
               </a:spcBef>
               <a:buNone/>
             </a:pPr>
-            <a:endParaRPr/>
+            <a:endParaRPr dirty="0"/>
           </a:p>
         </p:txBody>
       </p:sp>
@@ -1693,7 +1693,7 @@
               </a:spcBef>
               <a:buNone/>
             </a:pPr>
-            <a:endParaRPr/>
+            <a:endParaRPr dirty="0"/>
           </a:p>
         </p:txBody>
       </p:sp>
@@ -1809,7 +1809,7 @@
               </a:spcBef>
               <a:buNone/>
             </a:pPr>
-            <a:endParaRPr/>
+            <a:endParaRPr dirty="0"/>
           </a:p>
         </p:txBody>
       </p:sp>
@@ -2015,7 +2015,7 @@
               <a:pPr/>
               <a:t>2</a:t>
             </a:fld>
-            <a:endParaRPr lang="en-US" sz="1200">
+            <a:endParaRPr lang="en-US" sz="1200" dirty="0">
               <a:latin typeface="Times" pitchFamily="18" charset="0"/>
             </a:endParaRPr>
           </a:p>
@@ -2208,9 +2208,9 @@
                 </a:spcBef>
                 <a:buClrTx/>
               </a:pPr>
-              <a:t>2/2/2015</a:t>
+              <a:t>2/6/2015</a:t>
             </a:fld>
-            <a:endParaRPr lang="en-US" sz="1200">
+            <a:endParaRPr lang="en-US" sz="1200" dirty="0">
               <a:cs typeface="Arial" pitchFamily="34" charset="0"/>
             </a:endParaRPr>
           </a:p>
@@ -2391,7 +2391,7 @@
               <a:buClrTx/>
             </a:pPr>
             <a:r>
-              <a:rPr lang="en-US" sz="1200">
+              <a:rPr lang="en-US" sz="1200" dirty="0">
                 <a:cs typeface="Arial" pitchFamily="34" charset="0"/>
               </a:rPr>
               <a:t>Oracle Confidential</a:t>
@@ -2588,7 +2588,7 @@
               </a:pPr>
               <a:t>2</a:t>
             </a:fld>
-            <a:endParaRPr lang="en-US" sz="1200">
+            <a:endParaRPr lang="en-US" sz="1200" dirty="0">
               <a:cs typeface="Arial" pitchFamily="34" charset="0"/>
             </a:endParaRPr>
           </a:p>
@@ -2780,31 +2780,7 @@
                 <a:ea typeface="+mn-ea"/>
                 <a:cs typeface="+mn-cs"/>
               </a:rPr>
-              <a:t>(Source: a presentation by Jim Diamond, Managing Director of Operations &amp; Research at American Airlines. Given at the </a:t>
-            </a:r>
-            <a:r>
-              <a:rPr lang="en-US" sz="1200" i="1" kern="1200" dirty="0" err="1" smtClean="0">
-                <a:solidFill>
-                  <a:schemeClr val="tx1"/>
-                </a:solidFill>
-                <a:effectLst/>
-                <a:latin typeface="+mn-lt"/>
-                <a:ea typeface="+mn-ea"/>
-                <a:cs typeface="+mn-cs"/>
-              </a:rPr>
-              <a:t>Evanta</a:t>
-            </a:r>
-            <a:r>
-              <a:rPr lang="en-US" sz="1200" i="1" kern="1200" dirty="0" smtClean="0">
-                <a:solidFill>
-                  <a:schemeClr val="tx1"/>
-                </a:solidFill>
-                <a:effectLst/>
-                <a:latin typeface="+mn-lt"/>
-                <a:ea typeface="+mn-ea"/>
-                <a:cs typeface="+mn-cs"/>
-              </a:rPr>
-              <a:t> CIO event in Dallas, TX 6/7/13)</a:t>
+              <a:t>(Source: a presentation by Jim Diamond, Managing Director of Operations &amp; Research at American Airlines. Given at the Evanta CIO event in Dallas, TX 6/7/13)</a:t>
             </a:r>
           </a:p>
           <a:p>
@@ -3071,7 +3047,7 @@
               </a:spcBef>
               <a:buNone/>
             </a:pPr>
-            <a:endParaRPr/>
+            <a:endParaRPr dirty="0"/>
           </a:p>
         </p:txBody>
       </p:sp>
@@ -3187,7 +3163,7 @@
               </a:spcBef>
               <a:buNone/>
             </a:pPr>
-            <a:endParaRPr/>
+            <a:endParaRPr dirty="0"/>
           </a:p>
         </p:txBody>
       </p:sp>
@@ -3303,7 +3279,7 @@
               </a:spcBef>
               <a:buNone/>
             </a:pPr>
-            <a:endParaRPr/>
+            <a:endParaRPr dirty="0"/>
           </a:p>
         </p:txBody>
       </p:sp>
@@ -3538,7 +3514,7 @@
               </a:spcBef>
               <a:buNone/>
             </a:pPr>
-            <a:endParaRPr/>
+            <a:endParaRPr dirty="0"/>
           </a:p>
         </p:txBody>
       </p:sp>
@@ -3773,7 +3749,7 @@
               </a:spcBef>
               <a:buNone/>
             </a:pPr>
-            <a:endParaRPr/>
+            <a:endParaRPr dirty="0"/>
           </a:p>
         </p:txBody>
       </p:sp>
@@ -3889,7 +3865,7 @@
               </a:spcBef>
               <a:buNone/>
             </a:pPr>
-            <a:endParaRPr/>
+            <a:endParaRPr dirty="0"/>
           </a:p>
         </p:txBody>
       </p:sp>
@@ -4005,7 +3981,7 @@
               </a:spcBef>
               <a:buNone/>
             </a:pPr>
-            <a:endParaRPr/>
+            <a:endParaRPr dirty="0"/>
           </a:p>
         </p:txBody>
       </p:sp>
@@ -4121,7 +4097,7 @@
               </a:spcBef>
               <a:buNone/>
             </a:pPr>
-            <a:endParaRPr/>
+            <a:endParaRPr dirty="0"/>
           </a:p>
         </p:txBody>
       </p:sp>
@@ -4237,7 +4213,7 @@
               </a:spcBef>
               <a:buNone/>
             </a:pPr>
-            <a:endParaRPr/>
+            <a:endParaRPr dirty="0"/>
           </a:p>
         </p:txBody>
       </p:sp>
@@ -4353,7 +4329,7 @@
               </a:spcBef>
               <a:buNone/>
             </a:pPr>
-            <a:endParaRPr/>
+            <a:endParaRPr dirty="0"/>
           </a:p>
         </p:txBody>
       </p:sp>
@@ -4469,7 +4445,7 @@
               </a:spcBef>
               <a:buNone/>
             </a:pPr>
-            <a:endParaRPr/>
+            <a:endParaRPr dirty="0"/>
           </a:p>
         </p:txBody>
       </p:sp>
@@ -4585,7 +4561,7 @@
               </a:spcBef>
               <a:buNone/>
             </a:pPr>
-            <a:endParaRPr/>
+            <a:endParaRPr dirty="0"/>
           </a:p>
         </p:txBody>
       </p:sp>
@@ -4701,7 +4677,7 @@
               </a:spcBef>
               <a:buNone/>
             </a:pPr>
-            <a:endParaRPr/>
+            <a:endParaRPr dirty="0"/>
           </a:p>
         </p:txBody>
       </p:sp>
@@ -5052,9 +5028,9 @@
           <a:p>
             <a:fld id="{2B620634-F1E7-4F42-B7F2-04F33F3FC495}" type="datetimeFigureOut">
               <a:rPr lang="en-US" smtClean="0"/>
-              <a:t>2/2/2015</a:t>
+              <a:t>2/6/2015</a:t>
             </a:fld>
-            <a:endParaRPr lang="en-US"/>
+            <a:endParaRPr lang="en-US" dirty="0"/>
           </a:p>
         </p:txBody>
       </p:sp>
@@ -5073,7 +5049,7 @@
           <a:bodyPr/>
           <a:lstStyle/>
           <a:p>
-            <a:endParaRPr lang="en-US"/>
+            <a:endParaRPr lang="en-US" dirty="0"/>
           </a:p>
         </p:txBody>
       </p:sp>
@@ -5096,7 +5072,7 @@
               <a:rPr lang="en-US" smtClean="0"/>
               <a:t>‹#›</a:t>
             </a:fld>
-            <a:endParaRPr lang="en-US"/>
+            <a:endParaRPr lang="en-US" dirty="0"/>
           </a:p>
         </p:txBody>
       </p:sp>
@@ -5487,7 +5463,7 @@
           <a:p>
             <a:pPr lvl="0"/>
             <a:r>
-              <a:rPr lang="en-US" noProof="0" smtClean="0"/>
+              <a:rPr lang="en-US" noProof="0" dirty="0" smtClean="0"/>
               <a:t>Click icon to add chart</a:t>
             </a:r>
             <a:endParaRPr lang="en-US" noProof="0" dirty="0"/>
@@ -10909,8 +10885,8 @@
         </p:nvSpPr>
         <p:spPr>
           <a:xfrm>
-            <a:off x="556952" y="3310731"/>
-            <a:ext cx="7772400" cy="1101725"/>
+            <a:off x="1213658" y="3310731"/>
+            <a:ext cx="6417424" cy="1101725"/>
           </a:xfrm>
           <a:prstGeom prst="rect">
             <a:avLst/>
@@ -10949,7 +10925,15 @@
                   <a:schemeClr val="bg1"/>
                 </a:solidFill>
               </a:rPr>
-              <a:t>Visualize Voluminous Quantities of Data with Oracle R Enterprise</a:t>
+              <a:t>Visualize Voluminous Quantities of Data with </a:t>
+            </a:r>
+            <a:r>
+              <a:rPr lang="en" sz="3200" dirty="0" smtClean="0">
+                <a:solidFill>
+                  <a:schemeClr val="bg1"/>
+                </a:solidFill>
+              </a:rPr>
+              <a:t>R</a:t>
             </a:r>
             <a:r>
               <a:rPr lang="en" sz="3600" dirty="0">
@@ -11621,12 +11605,8 @@
           <a:lstStyle/>
           <a:p>
             <a:r>
-              <a:rPr lang="en-US" dirty="0" err="1" smtClean="0"/>
-              <a:t>ggplot</a:t>
-            </a:r>
-            <a:r>
               <a:rPr lang="en-US" dirty="0" smtClean="0"/>
-              <a:t> package</a:t>
+              <a:t>ggplot package</a:t>
             </a:r>
             <a:endParaRPr lang="en-US" dirty="0"/>
           </a:p>
@@ -11671,13 +11651,13 @@
   <p:clrMapOvr>
     <a:masterClrMapping/>
   </p:clrMapOvr>
-  <mc:AlternateContent xmlns:mc="http://schemas.openxmlformats.org/markup-compatibility/2006">
-    <mc:Choice xmlns:p14="http://schemas.microsoft.com/office/powerpoint/2010/main" Requires="p14">
+  <mc:AlternateContent xmlns:mc="http://schemas.openxmlformats.org/markup-compatibility/2006" xmlns:p14="http://schemas.microsoft.com/office/powerpoint/2010/main">
+    <mc:Choice Requires="p14">
       <p:transition spd="slow" p14:dur="3400">
         <p14:reveal/>
       </p:transition>
     </mc:Choice>
-    <mc:Fallback>
+    <mc:Fallback xmlns="">
       <p:transition spd="slow">
         <p:fade/>
       </p:transition>
@@ -12666,7 +12646,7 @@
           </a:lstStyle>
           <a:p>
             <a:r>
-              <a:rPr lang="en-US" sz="1050">
+              <a:rPr lang="en-US" sz="1050" dirty="0">
                 <a:cs typeface="Times New Roman" pitchFamily="18" charset="0"/>
               </a:rPr>
               <a:t>                                                                                                                                                                         </a:t>
@@ -12678,7 +12658,7 @@
               <a:pPr/>
               <a:t>2</a:t>
             </a:fld>
-            <a:endParaRPr lang="en-US" sz="1050">
+            <a:endParaRPr lang="en-US" sz="1050" dirty="0">
               <a:cs typeface="Times New Roman" pitchFamily="18" charset="0"/>
             </a:endParaRPr>
           </a:p>
@@ -12740,7 +12720,7 @@
               </a:spcBef>
               <a:buClrTx/>
             </a:pPr>
-            <a:endParaRPr lang="en-US" sz="1350">
+            <a:endParaRPr lang="en-US" sz="1350" dirty="0">
               <a:cs typeface="Arial" pitchFamily="34" charset="0"/>
             </a:endParaRPr>
           </a:p>
@@ -12806,7 +12786,7 @@
               </a:spcBef>
               <a:buClrTx/>
             </a:pPr>
-            <a:endParaRPr lang="en-US" sz="825" b="1">
+            <a:endParaRPr lang="en-US" sz="825" b="1" dirty="0">
               <a:solidFill>
                 <a:schemeClr val="bg1"/>
               </a:solidFill>
@@ -13144,7 +13124,7 @@
                 </a:spcBef>
                 <a:buClrTx/>
               </a:pPr>
-              <a:endParaRPr lang="en-US" sz="825" b="1">
+              <a:endParaRPr lang="en-US" sz="825" b="1" dirty="0">
                 <a:solidFill>
                   <a:schemeClr val="bg1"/>
                 </a:solidFill>
@@ -13201,7 +13181,7 @@
                 </a:spcBef>
                 <a:buClrTx/>
               </a:pPr>
-              <a:endParaRPr lang="en-US" sz="825" b="1">
+              <a:endParaRPr lang="en-US" sz="825" b="1" dirty="0">
                 <a:solidFill>
                   <a:schemeClr val="bg1"/>
                 </a:solidFill>
@@ -13256,7 +13236,7 @@
               </a:spcBef>
               <a:buClrTx/>
             </a:pPr>
-            <a:endParaRPr lang="en-US" sz="825" b="1">
+            <a:endParaRPr lang="en-US" sz="825" b="1" dirty="0">
               <a:solidFill>
                 <a:schemeClr val="bg1"/>
               </a:solidFill>
@@ -13310,7 +13290,7 @@
               </a:spcBef>
               <a:buClrTx/>
             </a:pPr>
-            <a:endParaRPr lang="en-US" sz="825" b="1">
+            <a:endParaRPr lang="en-US" sz="825" b="1" dirty="0">
               <a:solidFill>
                 <a:schemeClr val="bg1"/>
               </a:solidFill>
@@ -13364,7 +13344,7 @@
               </a:spcBef>
               <a:buClrTx/>
             </a:pPr>
-            <a:endParaRPr lang="en-US" sz="825" b="1">
+            <a:endParaRPr lang="en-US" sz="825" b="1" dirty="0">
               <a:solidFill>
                 <a:schemeClr val="bg1"/>
               </a:solidFill>
@@ -13418,7 +13398,7 @@
               </a:spcBef>
               <a:buClrTx/>
             </a:pPr>
-            <a:endParaRPr lang="en-US" sz="825" b="1">
+            <a:endParaRPr lang="en-US" sz="825" b="1" dirty="0">
               <a:solidFill>
                 <a:schemeClr val="bg1"/>
               </a:solidFill>
@@ -13488,7 +13468,7 @@
                 </a:spcBef>
                 <a:buClrTx/>
               </a:pPr>
-              <a:endParaRPr lang="en-US" sz="825" b="1">
+              <a:endParaRPr lang="en-US" sz="825" b="1" dirty="0">
                 <a:solidFill>
                   <a:schemeClr val="bg1"/>
                 </a:solidFill>
@@ -13721,7 +13701,7 @@
               </a:spcBef>
               <a:buClrTx/>
             </a:pPr>
-            <a:endParaRPr lang="en-US" sz="825" b="1">
+            <a:endParaRPr lang="en-US" sz="825" b="1" dirty="0">
               <a:solidFill>
                 <a:schemeClr val="bg1"/>
               </a:solidFill>
@@ -13778,18 +13758,11 @@
               <a:defRPr/>
             </a:pPr>
             <a:r>
-              <a:rPr lang="en-US" sz="1050" dirty="0" err="1">
-                <a:latin typeface="Arial" charset="0"/>
-                <a:cs typeface="Arial" charset="0"/>
-              </a:rPr>
-              <a:t>Exabytes</a:t>
-            </a:r>
-            <a:r>
               <a:rPr lang="en-US" sz="1050" dirty="0">
                 <a:latin typeface="Arial" charset="0"/>
                 <a:cs typeface="Arial" charset="0"/>
               </a:rPr>
-              <a:t> get generated every day</a:t>
+              <a:t>Exabytes get generated every day</a:t>
             </a:r>
           </a:p>
           <a:p>

</xml_diff>